<commit_message>
single case tests improvement
</commit_message>
<xml_diff>
--- a/vignettes/images/images.pptx
+++ b/vignettes/images/images.pptx
@@ -248,7 +248,7 @@
           <a:p>
             <a:fld id="{0977E934-55A3-4928-9DD6-E352CFB32F4D}" type="datetimeFigureOut">
               <a:rPr lang="fr-FR" smtClean="0"/>
-              <a:t>11/01/2018</a:t>
+              <a:t>02/05/2018</a:t>
             </a:fld>
             <a:endParaRPr lang="fr-FR"/>
           </a:p>
@@ -418,7 +418,7 @@
           <a:p>
             <a:fld id="{0977E934-55A3-4928-9DD6-E352CFB32F4D}" type="datetimeFigureOut">
               <a:rPr lang="fr-FR" smtClean="0"/>
-              <a:t>11/01/2018</a:t>
+              <a:t>02/05/2018</a:t>
             </a:fld>
             <a:endParaRPr lang="fr-FR"/>
           </a:p>
@@ -598,7 +598,7 @@
           <a:p>
             <a:fld id="{0977E934-55A3-4928-9DD6-E352CFB32F4D}" type="datetimeFigureOut">
               <a:rPr lang="fr-FR" smtClean="0"/>
-              <a:t>11/01/2018</a:t>
+              <a:t>02/05/2018</a:t>
             </a:fld>
             <a:endParaRPr lang="fr-FR"/>
           </a:p>
@@ -768,7 +768,7 @@
           <a:p>
             <a:fld id="{0977E934-55A3-4928-9DD6-E352CFB32F4D}" type="datetimeFigureOut">
               <a:rPr lang="fr-FR" smtClean="0"/>
-              <a:t>11/01/2018</a:t>
+              <a:t>02/05/2018</a:t>
             </a:fld>
             <a:endParaRPr lang="fr-FR"/>
           </a:p>
@@ -1014,7 +1014,7 @@
           <a:p>
             <a:fld id="{0977E934-55A3-4928-9DD6-E352CFB32F4D}" type="datetimeFigureOut">
               <a:rPr lang="fr-FR" smtClean="0"/>
-              <a:t>11/01/2018</a:t>
+              <a:t>02/05/2018</a:t>
             </a:fld>
             <a:endParaRPr lang="fr-FR"/>
           </a:p>
@@ -1246,7 +1246,7 @@
           <a:p>
             <a:fld id="{0977E934-55A3-4928-9DD6-E352CFB32F4D}" type="datetimeFigureOut">
               <a:rPr lang="fr-FR" smtClean="0"/>
-              <a:t>11/01/2018</a:t>
+              <a:t>02/05/2018</a:t>
             </a:fld>
             <a:endParaRPr lang="fr-FR"/>
           </a:p>
@@ -1613,7 +1613,7 @@
           <a:p>
             <a:fld id="{0977E934-55A3-4928-9DD6-E352CFB32F4D}" type="datetimeFigureOut">
               <a:rPr lang="fr-FR" smtClean="0"/>
-              <a:t>11/01/2018</a:t>
+              <a:t>02/05/2018</a:t>
             </a:fld>
             <a:endParaRPr lang="fr-FR"/>
           </a:p>
@@ -1731,7 +1731,7 @@
           <a:p>
             <a:fld id="{0977E934-55A3-4928-9DD6-E352CFB32F4D}" type="datetimeFigureOut">
               <a:rPr lang="fr-FR" smtClean="0"/>
-              <a:t>11/01/2018</a:t>
+              <a:t>02/05/2018</a:t>
             </a:fld>
             <a:endParaRPr lang="fr-FR"/>
           </a:p>
@@ -1826,7 +1826,7 @@
           <a:p>
             <a:fld id="{0977E934-55A3-4928-9DD6-E352CFB32F4D}" type="datetimeFigureOut">
               <a:rPr lang="fr-FR" smtClean="0"/>
-              <a:t>11/01/2018</a:t>
+              <a:t>02/05/2018</a:t>
             </a:fld>
             <a:endParaRPr lang="fr-FR"/>
           </a:p>
@@ -2103,7 +2103,7 @@
           <a:p>
             <a:fld id="{0977E934-55A3-4928-9DD6-E352CFB32F4D}" type="datetimeFigureOut">
               <a:rPr lang="fr-FR" smtClean="0"/>
-              <a:t>11/01/2018</a:t>
+              <a:t>02/05/2018</a:t>
             </a:fld>
             <a:endParaRPr lang="fr-FR"/>
           </a:p>
@@ -2356,7 +2356,7 @@
           <a:p>
             <a:fld id="{0977E934-55A3-4928-9DD6-E352CFB32F4D}" type="datetimeFigureOut">
               <a:rPr lang="fr-FR" smtClean="0"/>
-              <a:t>11/01/2018</a:t>
+              <a:t>02/05/2018</a:t>
             </a:fld>
             <a:endParaRPr lang="fr-FR"/>
           </a:p>
@@ -2569,7 +2569,7 @@
           <a:p>
             <a:fld id="{0977E934-55A3-4928-9DD6-E352CFB32F4D}" type="datetimeFigureOut">
               <a:rPr lang="fr-FR" smtClean="0"/>
-              <a:t>11/01/2018</a:t>
+              <a:t>02/05/2018</a:t>
             </a:fld>
             <a:endParaRPr lang="fr-FR"/>
           </a:p>
@@ -2983,7 +2983,7 @@
           <p:nvPr/>
         </p:nvPicPr>
         <p:blipFill rotWithShape="1">
-          <a:blip r:embed="rId2">
+          <a:blip r:embed="rId2" cstate="print">
             <a:extLst>
               <a:ext uri="{28A0092B-C50C-407E-A947-70E740481C1C}">
                 <a14:useLocalDpi xmlns:a14="http://schemas.microsoft.com/office/drawing/2010/main" val="0"/>
@@ -3090,82 +3090,6 @@
               <a:latin typeface="ABeeZee" panose="02000000000000000000" pitchFamily="50" charset="0"/>
               <a:ea typeface="Roboto Bk" pitchFamily="2" charset="0"/>
             </a:endParaRPr>
-          </a:p>
-        </p:txBody>
-      </p:sp>
-      <p:sp>
-        <p:nvSpPr>
-          <p:cNvPr id="10" name="Rectangle 9"/>
-          <p:cNvSpPr/>
-          <p:nvPr/>
-        </p:nvSpPr>
-        <p:spPr>
-          <a:xfrm>
-            <a:off x="7795161" y="426545"/>
-            <a:ext cx="3462269" cy="1002808"/>
-          </a:xfrm>
-          <a:prstGeom prst="rect">
-            <a:avLst/>
-          </a:prstGeom>
-          <a:noFill/>
-          <a:ln>
-            <a:noFill/>
-          </a:ln>
-        </p:spPr>
-        <p:style>
-          <a:lnRef idx="2">
-            <a:schemeClr val="accent1">
-              <a:shade val="50000"/>
-            </a:schemeClr>
-          </a:lnRef>
-          <a:fillRef idx="1">
-            <a:schemeClr val="accent1"/>
-          </a:fillRef>
-          <a:effectRef idx="0">
-            <a:schemeClr val="accent1"/>
-          </a:effectRef>
-          <a:fontRef idx="minor">
-            <a:schemeClr val="lt1"/>
-          </a:fontRef>
-        </p:style>
-        <p:txBody>
-          <a:bodyPr rtlCol="0" anchor="ctr"/>
-          <a:lstStyle/>
-          <a:p>
-            <a:pPr algn="ctr"/>
-            <a:r>
-              <a:rPr lang="fr-FR" sz="5400" b="1" dirty="0">
-                <a:solidFill>
-                  <a:schemeClr val="tx1"/>
-                </a:solidFill>
-                <a:latin typeface="ABeeZee" panose="02000000000000000000" pitchFamily="50" charset="0"/>
-                <a:ea typeface="Roboto Bk" pitchFamily="2" charset="0"/>
-                <a:cs typeface="Calibri" panose="020F0502020204030204" pitchFamily="34" charset="0"/>
-              </a:rPr>
-              <a:t>PS</a:t>
-            </a:r>
-            <a:r>
-              <a:rPr lang="el-GR" sz="5400" b="1" dirty="0">
-                <a:solidFill>
-                  <a:srgbClr val="FF0000"/>
-                </a:solidFill>
-                <a:latin typeface="Arial Narrow" panose="020B0606020202030204" pitchFamily="34" charset="0"/>
-                <a:ea typeface="Roboto Bk" pitchFamily="2" charset="0"/>
-                <a:cs typeface="Calibri" panose="020F0502020204030204" pitchFamily="34" charset="0"/>
-              </a:rPr>
-              <a:t>Ψ</a:t>
-            </a:r>
-            <a:r>
-              <a:rPr lang="fr-FR" sz="5400" b="1" dirty="0">
-                <a:solidFill>
-                  <a:schemeClr val="tx1"/>
-                </a:solidFill>
-                <a:latin typeface="ABeeZee" panose="02000000000000000000" pitchFamily="50" charset="0"/>
-                <a:ea typeface="Roboto Bk" pitchFamily="2" charset="0"/>
-                <a:cs typeface="Calibri" panose="020F0502020204030204" pitchFamily="34" charset="0"/>
-              </a:rPr>
-              <a:t>CHO</a:t>
-            </a:r>
           </a:p>
         </p:txBody>
       </p:sp>
@@ -3307,7 +3231,6 @@
         <p:nvCxnSpPr>
           <p:cNvPr id="19" name="Straight Arrow Connector 18"/>
           <p:cNvCxnSpPr>
-            <a:stCxn id="10" idx="2"/>
             <a:endCxn id="9" idx="3"/>
           </p:cNvCxnSpPr>
           <p:nvPr/>
@@ -3871,7 +3794,7 @@
           <p:cNvPr id="20" name="Rectangle 19">
             <a:extLst>
               <a:ext uri="{FF2B5EF4-FFF2-40B4-BE49-F238E27FC236}">
-                <a16:creationId xmlns:a16="http://schemas.microsoft.com/office/drawing/2014/main" id="{DC4E932A-A851-4207-8257-91775AB92563}"/>
+                <a16:creationId xmlns:a16="http://schemas.microsoft.com/office/drawing/2014/main" xmlns="" id="{DC4E932A-A851-4207-8257-91775AB92563}"/>
               </a:ext>
             </a:extLst>
           </p:cNvPr>
@@ -3942,7 +3865,7 @@
           <p:cNvPr id="21" name="Rectangle 20">
             <a:extLst>
               <a:ext uri="{FF2B5EF4-FFF2-40B4-BE49-F238E27FC236}">
-                <a16:creationId xmlns:a16="http://schemas.microsoft.com/office/drawing/2014/main" id="{3C4EDE18-5E4B-4209-9177-9F54FED082A2}"/>
+                <a16:creationId xmlns:a16="http://schemas.microsoft.com/office/drawing/2014/main" xmlns="" id="{3C4EDE18-5E4B-4209-9177-9F54FED082A2}"/>
               </a:ext>
             </a:extLst>
           </p:cNvPr>
@@ -4013,7 +3936,7 @@
           <p:cNvPr id="22" name="Rectangle 21">
             <a:extLst>
               <a:ext uri="{FF2B5EF4-FFF2-40B4-BE49-F238E27FC236}">
-                <a16:creationId xmlns:a16="http://schemas.microsoft.com/office/drawing/2014/main" id="{B2C09CE3-0164-4F0F-884B-B3852CECCDEB}"/>
+                <a16:creationId xmlns:a16="http://schemas.microsoft.com/office/drawing/2014/main" xmlns="" id="{B2C09CE3-0164-4F0F-884B-B3852CECCDEB}"/>
               </a:ext>
             </a:extLst>
           </p:cNvPr>
@@ -4084,7 +4007,7 @@
           <p:cNvPr id="23" name="Rectangle 22">
             <a:extLst>
               <a:ext uri="{FF2B5EF4-FFF2-40B4-BE49-F238E27FC236}">
-                <a16:creationId xmlns:a16="http://schemas.microsoft.com/office/drawing/2014/main" id="{428DAA31-4093-4E33-8C3C-54CFA04C6136}"/>
+                <a16:creationId xmlns:a16="http://schemas.microsoft.com/office/drawing/2014/main" xmlns="" id="{428DAA31-4093-4E33-8C3C-54CFA04C6136}"/>
               </a:ext>
             </a:extLst>
           </p:cNvPr>
@@ -4150,6 +4073,36 @@
           </a:p>
         </p:txBody>
       </p:sp>
+      <p:pic>
+        <p:nvPicPr>
+          <p:cNvPr id="2" name="Picture 1"/>
+          <p:cNvPicPr>
+            <a:picLocks noChangeAspect="1"/>
+          </p:cNvPicPr>
+          <p:nvPr/>
+        </p:nvPicPr>
+        <p:blipFill>
+          <a:blip r:embed="rId3" cstate="print">
+            <a:extLst>
+              <a:ext uri="{28A0092B-C50C-407E-A947-70E740481C1C}">
+                <a14:useLocalDpi xmlns:a14="http://schemas.microsoft.com/office/drawing/2010/main" val="0"/>
+              </a:ext>
+            </a:extLst>
+          </a:blip>
+          <a:stretch>
+            <a:fillRect/>
+          </a:stretch>
+        </p:blipFill>
+        <p:spPr>
+          <a:xfrm>
+            <a:off x="8168537" y="650401"/>
+            <a:ext cx="2817184" cy="704296"/>
+          </a:xfrm>
+          <a:prstGeom prst="rect">
+            <a:avLst/>
+          </a:prstGeom>
+        </p:spPr>
+      </p:pic>
     </p:spTree>
     <p:extLst>
       <p:ext uri="{BB962C8B-B14F-4D97-AF65-F5344CB8AC3E}">

</xml_diff>